<commit_message>
Updates to presentation and breakdown estimates
</commit_message>
<xml_diff>
--- a/OpenPlazaCS360Lab/Presentations/OpenPlaza - Phase 2.pptx
+++ b/OpenPlazaCS360Lab/Presentations/OpenPlaza - Phase 2.pptx
@@ -8822,7 +8822,7 @@
           <a:p>
             <a:r>
               <a:rPr lang="en-US" dirty="0"/>
-              <a:t>Anna Milligan</a:t>
+              <a:t>Anna Milligan, V00815672</a:t>
             </a:r>
           </a:p>
           <a:p>
@@ -9552,7 +9552,7 @@
             </a:pPr>
             <a:r>
               <a:rPr lang="en-US" sz="2400" dirty="0"/>
-              <a:t>Continue implementing a frontend</a:t>
+              <a:t>Continue implementing a frontend, including images</a:t>
             </a:r>
           </a:p>
           <a:p>
@@ -9569,7 +9569,7 @@
             </a:pPr>
             <a:r>
               <a:rPr lang="en-US" sz="2400" dirty="0"/>
-              <a:t>Improve backend functionality</a:t>
+              <a:t>Improvements to backend, especially security</a:t>
             </a:r>
           </a:p>
           <a:p>
@@ -9586,8 +9586,13 @@
             </a:pPr>
             <a:r>
               <a:rPr lang="en-US" sz="2400" dirty="0"/>
-              <a:t>Continue improving security</a:t>
-            </a:r>
+              <a:t>More features, such </a:t>
+            </a:r>
+            <a:r>
+              <a:rPr lang="en-US" sz="2400"/>
+              <a:t>as admin panel</a:t>
+            </a:r>
+            <a:endParaRPr lang="en-US" sz="2400" dirty="0"/>
           </a:p>
           <a:p>
             <a:pPr marL="342900" indent="-342900">
@@ -9735,20 +9740,8 @@
             </a:pPr>
             <a:r>
               <a:rPr lang="en-US" sz="2400" dirty="0"/>
-              <a:t>Producing a backend that is modular and can be attached to any frontend, as we do not have </a:t>
-            </a:r>
-            <a:r>
-              <a:rPr lang="en-US" sz="2400"/>
-              <a:t>a frontend layout</a:t>
-            </a:r>
-            <a:endParaRPr lang="en-US" sz="2400" dirty="0"/>
-          </a:p>
-          <a:p>
-            <a:pPr marL="342900" indent="-342900">
-              <a:buFont typeface="Arial" panose="020B0604020202020204" pitchFamily="34" charset="0"/>
-              <a:buChar char="•"/>
-            </a:pPr>
-            <a:endParaRPr lang="en-US" sz="2400" dirty="0"/>
+              <a:t>Producing a backend that is modular and can be attached to any frontend</a:t>
+            </a:r>
           </a:p>
           <a:p>
             <a:pPr marL="342900" indent="-342900">
@@ -9946,6 +9939,13 @@
               <a:buFont typeface="Arial" panose="020B0604020202020204" pitchFamily="34" charset="0"/>
               <a:buChar char="•"/>
             </a:pPr>
+            <a:endParaRPr lang="en-US" sz="2400" dirty="0"/>
+          </a:p>
+          <a:p>
+            <a:pPr marL="342900" indent="-342900">
+              <a:buFont typeface="Arial" panose="020B0604020202020204" pitchFamily="34" charset="0"/>
+              <a:buChar char="•"/>
+            </a:pPr>
             <a:endParaRPr lang="en-US" dirty="0"/>
           </a:p>
           <a:p>
@@ -10158,12 +10158,8 @@
               <a:buChar char="•"/>
             </a:pPr>
             <a:r>
-              <a:rPr lang="en-US" sz="2400"/>
-              <a:t>Update </a:t>
-            </a:r>
-            <a:r>
               <a:rPr lang="en-US" sz="2400" dirty="0"/>
-              <a:t>guiding flavor text</a:t>
+              <a:t>Update guiding flavor text</a:t>
             </a:r>
           </a:p>
           <a:p>

</xml_diff>

<commit_message>
Updates and fresh database
</commit_message>
<xml_diff>
--- a/OpenPlazaCS360Lab/Presentations/OpenPlaza - Phase 2.pptx
+++ b/OpenPlazaCS360Lab/Presentations/OpenPlaza - Phase 2.pptx
@@ -9586,13 +9586,8 @@
             </a:pPr>
             <a:r>
               <a:rPr lang="en-US" sz="2400" dirty="0"/>
-              <a:t>More features, such </a:t>
-            </a:r>
-            <a:r>
-              <a:rPr lang="en-US" sz="2400"/>
-              <a:t>as admin panel</a:t>
-            </a:r>
-            <a:endParaRPr lang="en-US" sz="2400" dirty="0"/>
+              <a:t>More features, such as admin panel</a:t>
+            </a:r>
           </a:p>
           <a:p>
             <a:pPr marL="342900" indent="-342900">
@@ -9742,6 +9737,28 @@
               <a:rPr lang="en-US" sz="2400" dirty="0"/>
               <a:t>Producing a backend that is modular and can be attached to any frontend</a:t>
             </a:r>
+          </a:p>
+          <a:p>
+            <a:pPr marL="342900" indent="-342900">
+              <a:buFont typeface="Arial" panose="020B0604020202020204" pitchFamily="34" charset="0"/>
+              <a:buChar char="•"/>
+            </a:pPr>
+            <a:endParaRPr lang="en-US" sz="2400" dirty="0"/>
+          </a:p>
+          <a:p>
+            <a:pPr marL="342900" indent="-342900">
+              <a:buFont typeface="Arial" panose="020B0604020202020204" pitchFamily="34" charset="0"/>
+              <a:buChar char="•"/>
+            </a:pPr>
+            <a:r>
+              <a:rPr lang="en-US" sz="2400" dirty="0"/>
+              <a:t>Difficulties with PHP and getting </a:t>
+            </a:r>
+            <a:r>
+              <a:rPr lang="en-US" sz="2400"/>
+              <a:t>it functioning</a:t>
+            </a:r>
+            <a:endParaRPr lang="en-US" sz="2400" dirty="0"/>
           </a:p>
           <a:p>
             <a:pPr marL="342900" indent="-342900">

</xml_diff>